<commit_message>
New updates by vinay
</commit_message>
<xml_diff>
--- a/Minor Project Presentation.pptx
+++ b/Minor Project Presentation.pptx
@@ -2846,7 +2846,7 @@
           <a:p>
             <a:fld id="{44A778BD-DE76-4CFC-A57D-641B6A75F639}" type="datetimeFigureOut">
               <a:rPr lang="en-US" smtClean="0"/>
-              <a:t>29-Sep-22</a:t>
+              <a:t>12-Oct-22</a:t>
             </a:fld>
             <a:endParaRPr lang="en-US"/>
           </a:p>
@@ -3044,7 +3044,7 @@
           <a:p>
             <a:fld id="{44A778BD-DE76-4CFC-A57D-641B6A75F639}" type="datetimeFigureOut">
               <a:rPr lang="en-US" smtClean="0"/>
-              <a:t>29-Sep-22</a:t>
+              <a:t>12-Oct-22</a:t>
             </a:fld>
             <a:endParaRPr lang="en-US"/>
           </a:p>
@@ -3252,7 +3252,7 @@
           <a:p>
             <a:fld id="{44A778BD-DE76-4CFC-A57D-641B6A75F639}" type="datetimeFigureOut">
               <a:rPr lang="en-US" smtClean="0"/>
-              <a:t>29-Sep-22</a:t>
+              <a:t>12-Oct-22</a:t>
             </a:fld>
             <a:endParaRPr lang="en-US"/>
           </a:p>
@@ -3450,7 +3450,7 @@
           <a:p>
             <a:fld id="{44A778BD-DE76-4CFC-A57D-641B6A75F639}" type="datetimeFigureOut">
               <a:rPr lang="en-US" smtClean="0"/>
-              <a:t>29-Sep-22</a:t>
+              <a:t>12-Oct-22</a:t>
             </a:fld>
             <a:endParaRPr lang="en-US"/>
           </a:p>
@@ -3725,7 +3725,7 @@
           <a:p>
             <a:fld id="{44A778BD-DE76-4CFC-A57D-641B6A75F639}" type="datetimeFigureOut">
               <a:rPr lang="en-US" smtClean="0"/>
-              <a:t>29-Sep-22</a:t>
+              <a:t>12-Oct-22</a:t>
             </a:fld>
             <a:endParaRPr lang="en-US"/>
           </a:p>
@@ -3990,7 +3990,7 @@
           <a:p>
             <a:fld id="{44A778BD-DE76-4CFC-A57D-641B6A75F639}" type="datetimeFigureOut">
               <a:rPr lang="en-US" smtClean="0"/>
-              <a:t>29-Sep-22</a:t>
+              <a:t>12-Oct-22</a:t>
             </a:fld>
             <a:endParaRPr lang="en-US"/>
           </a:p>
@@ -4402,7 +4402,7 @@
           <a:p>
             <a:fld id="{44A778BD-DE76-4CFC-A57D-641B6A75F639}" type="datetimeFigureOut">
               <a:rPr lang="en-US" smtClean="0"/>
-              <a:t>29-Sep-22</a:t>
+              <a:t>12-Oct-22</a:t>
             </a:fld>
             <a:endParaRPr lang="en-US"/>
           </a:p>
@@ -4543,7 +4543,7 @@
           <a:p>
             <a:fld id="{44A778BD-DE76-4CFC-A57D-641B6A75F639}" type="datetimeFigureOut">
               <a:rPr lang="en-US" smtClean="0"/>
-              <a:t>29-Sep-22</a:t>
+              <a:t>12-Oct-22</a:t>
             </a:fld>
             <a:endParaRPr lang="en-US"/>
           </a:p>
@@ -4656,7 +4656,7 @@
           <a:p>
             <a:fld id="{44A778BD-DE76-4CFC-A57D-641B6A75F639}" type="datetimeFigureOut">
               <a:rPr lang="en-US" smtClean="0"/>
-              <a:t>29-Sep-22</a:t>
+              <a:t>12-Oct-22</a:t>
             </a:fld>
             <a:endParaRPr lang="en-US"/>
           </a:p>
@@ -4967,7 +4967,7 @@
           <a:p>
             <a:fld id="{44A778BD-DE76-4CFC-A57D-641B6A75F639}" type="datetimeFigureOut">
               <a:rPr lang="en-US" smtClean="0"/>
-              <a:t>29-Sep-22</a:t>
+              <a:t>12-Oct-22</a:t>
             </a:fld>
             <a:endParaRPr lang="en-US"/>
           </a:p>
@@ -5255,7 +5255,7 @@
           <a:p>
             <a:fld id="{44A778BD-DE76-4CFC-A57D-641B6A75F639}" type="datetimeFigureOut">
               <a:rPr lang="en-US" smtClean="0"/>
-              <a:t>29-Sep-22</a:t>
+              <a:t>12-Oct-22</a:t>
             </a:fld>
             <a:endParaRPr lang="en-US"/>
           </a:p>
@@ -5496,7 +5496,7 @@
           <a:p>
             <a:fld id="{44A778BD-DE76-4CFC-A57D-641B6A75F639}" type="datetimeFigureOut">
               <a:rPr lang="en-US" smtClean="0"/>
-              <a:t>29-Sep-22</a:t>
+              <a:t>12-Oct-22</a:t>
             </a:fld>
             <a:endParaRPr lang="en-US"/>
           </a:p>
@@ -9921,12 +9921,9 @@
 </file>
 
 <file path=customXml/item1.xml><?xml version="1.0" encoding="utf-8"?>
-<?mso-contentType ?>
-<FormTemplates xmlns="http://schemas.microsoft.com/sharepoint/v3/contenttype/forms">
-  <Display>DocumentLibraryForm</Display>
-  <Edit>DocumentLibraryForm</Edit>
-  <New>DocumentLibraryForm</New>
-</FormTemplates>
+<p:properties xmlns:p="http://schemas.microsoft.com/office/2006/metadata/properties" xmlns:xsi="http://www.w3.org/2001/XMLSchema-instance" xmlns:pc="http://schemas.microsoft.com/office/infopath/2007/PartnerControls">
+  <documentManagement/>
+</p:properties>
 </file>
 
 <file path=customXml/item2.xml><?xml version="1.0" encoding="utf-8"?>
@@ -10044,15 +10041,25 @@
 </file>
 
 <file path=customXml/item3.xml><?xml version="1.0" encoding="utf-8"?>
-<p:properties xmlns:p="http://schemas.microsoft.com/office/2006/metadata/properties" xmlns:xsi="http://www.w3.org/2001/XMLSchema-instance" xmlns:pc="http://schemas.microsoft.com/office/infopath/2007/PartnerControls">
-  <documentManagement/>
-</p:properties>
+<?mso-contentType ?>
+<FormTemplates xmlns="http://schemas.microsoft.com/sharepoint/v3/contenttype/forms">
+  <Display>DocumentLibraryForm</Display>
+  <Edit>DocumentLibraryForm</Edit>
+  <New>DocumentLibraryForm</New>
+</FormTemplates>
 </file>
 
 <file path=customXml/itemProps1.xml><?xml version="1.0" encoding="utf-8"?>
-<ds:datastoreItem xmlns:ds="http://schemas.openxmlformats.org/officeDocument/2006/customXml" ds:itemID="{DD4EA32D-444E-43C4-ADE3-7E9E7C38C000}">
+<ds:datastoreItem xmlns:ds="http://schemas.openxmlformats.org/officeDocument/2006/customXml" ds:itemID="{468BE02F-F2D0-45A5-8EFD-31D489340B89}">
   <ds:schemaRefs>
-    <ds:schemaRef ds:uri="http://schemas.microsoft.com/sharepoint/v3/contenttype/forms"/>
+    <ds:schemaRef ds:uri="http://purl.org/dc/terms/"/>
+    <ds:schemaRef ds:uri="http://schemas.microsoft.com/office/2006/documentManagement/types"/>
+    <ds:schemaRef ds:uri="http://purl.org/dc/dcmitype/"/>
+    <ds:schemaRef ds:uri="http://purl.org/dc/elements/1.1/"/>
+    <ds:schemaRef ds:uri="http://schemas.microsoft.com/office/2006/metadata/properties"/>
+    <ds:schemaRef ds:uri="http://schemas.microsoft.com/office/infopath/2007/PartnerControls"/>
+    <ds:schemaRef ds:uri="http://schemas.openxmlformats.org/package/2006/metadata/core-properties"/>
+    <ds:schemaRef ds:uri="http://www.w3.org/XML/1998/namespace"/>
   </ds:schemaRefs>
 </ds:datastoreItem>
 </file>
@@ -10074,16 +10081,9 @@
 </file>
 
 <file path=customXml/itemProps3.xml><?xml version="1.0" encoding="utf-8"?>
-<ds:datastoreItem xmlns:ds="http://schemas.openxmlformats.org/officeDocument/2006/customXml" ds:itemID="{468BE02F-F2D0-45A5-8EFD-31D489340B89}">
+<ds:datastoreItem xmlns:ds="http://schemas.openxmlformats.org/officeDocument/2006/customXml" ds:itemID="{DD4EA32D-444E-43C4-ADE3-7E9E7C38C000}">
   <ds:schemaRefs>
-    <ds:schemaRef ds:uri="http://purl.org/dc/terms/"/>
-    <ds:schemaRef ds:uri="http://schemas.microsoft.com/office/2006/documentManagement/types"/>
-    <ds:schemaRef ds:uri="http://purl.org/dc/dcmitype/"/>
-    <ds:schemaRef ds:uri="http://purl.org/dc/elements/1.1/"/>
-    <ds:schemaRef ds:uri="http://schemas.microsoft.com/office/2006/metadata/properties"/>
-    <ds:schemaRef ds:uri="http://schemas.microsoft.com/office/infopath/2007/PartnerControls"/>
-    <ds:schemaRef ds:uri="http://schemas.openxmlformats.org/package/2006/metadata/core-properties"/>
-    <ds:schemaRef ds:uri="http://www.w3.org/XML/1998/namespace"/>
+    <ds:schemaRef ds:uri="http://schemas.microsoft.com/sharepoint/v3/contenttype/forms"/>
   </ds:schemaRefs>
 </ds:datastoreItem>
 </file>
</xml_diff>